<commit_message>
latest fixes by Veena
</commit_message>
<xml_diff>
--- a/calendar.pptx
+++ b/calendar.pptx
@@ -3008,7 +3008,7 @@
                 </a:solidFill>
                 <a:latin typeface="Intel Clear"/>
               </a:rPr>
-              <a:t>Recognition Communications Campaign</a:t>
+              <a:t>IIPM*&amp;amp;$t*&amp;amp;#@^$^#@*&amp;amp;$@*&amp;amp;&amp;amp;^#$</a:t>
             </a:r>
             <a:br/>
             <a:br/>
@@ -3019,7 +3019,7 @@
                 </a:solidFill>
                 <a:latin typeface="Intel Clear"/>
               </a:rPr>
-              <a:t>By : Michael Thomas</a:t>
+              <a:t>By : 87Q^#@%%</a:t>
             </a:r>
           </a:p>
         </p:txBody>
@@ -3101,7 +3101,7 @@
                 </a:solidFill>
                 <a:latin typeface="Intel Clear"/>
               </a:rPr>
-              <a:t>Campaign: Recognition Communications Campaign</a:t>
+              <a:t>Campaign: IIPM*&amp;amp;$t*&amp;amp;#@^$^#@*&amp;amp;$@*&amp;amp;&amp;amp;^#$</a:t>
             </a:r>
           </a:p>
         </p:txBody>
@@ -3136,7 +3136,7 @@
                 </a:solidFill>
                 <a:latin typeface="Intel Clear"/>
               </a:rPr>
-              <a:t>- HRMC Owner : Michael Thomas</a:t>
+              <a:t>- HRMC Owner : 87Q^#@%%</a:t>
             </a:r>
             <a:br/>
             <a:br/>
@@ -3274,7 +3274,7 @@
                 </a:solidFill>
                 <a:latin typeface="Intel Clear"/>
               </a:rPr>
-              <a:t>    - Launch the new Care and Appreciation Program on the recognition intel.com platform on February 27, 2018.  </a:t>
+              <a:t>    - $%#$%#%&amp;amp;^#r@^%#</a:t>
             </a:r>
             <a:br/>
             <a:br/>
@@ -3296,7 +3296,7 @@
                 </a:solidFill>
                 <a:latin typeface="Intel Clear"/>
               </a:rPr>
-              <a:t>    - Recognition just got more personal and social </a:t>
+              <a:t>    - $%#$%#%&amp;amp;^#r@^%#</a:t>
             </a:r>
           </a:p>
         </p:txBody>
@@ -3423,7 +3423,7 @@
                 </a:solidFill>
                 <a:latin typeface="Intel Clear"/>
               </a:rPr>
-              <a:t>   - External,Internal-All Employees,</a:t>
+              <a:t>   - External,Regional-GAR,Others,</a:t>
             </a:r>
             <a:br/>
             <a:br/>
@@ -3445,7 +3445,7 @@
                 </a:solidFill>
                 <a:latin typeface="Intel Clear"/>
               </a:rPr>
-              <a:t>   - Ensure Communications are embedded in the tool and features real-time job aids, videos to help user impacting the world every day deserves a celebration along the way </a:t>
+              <a:t>   - test</a:t>
             </a:r>
             <a:br/>
             <a:br/>
@@ -3518,7 +3518,7 @@
         <p:spPr>
           <a:xfrm rot="0">
             <a:off x="95250" y="1333500"/>
-            <a:ext cx="3305175" cy="2381250"/>
+            <a:ext cx="2381250" cy="2381250"/>
           </a:xfrm>
           <a:prstGeom prst="rect">
             <a:avLst/>
@@ -3597,7 +3597,7 @@
                 </a:solidFill>
                 <a:latin typeface="Intel Clear"/>
               </a:rPr>
-              <a:t>test661</a:t>
+              <a:t>hgsavdhg</a:t>
             </a:r>
           </a:p>
         </p:txBody>
@@ -3747,7 +3747,7 @@
                 </a:solidFill>
                 <a:latin typeface="Intel Clear"/>
               </a:rPr>
-              <a:t>test671</a:t>
+              <a:t>dwqd</a:t>
             </a:r>
           </a:p>
         </p:txBody>

</xml_diff>